<commit_message>
Added in Mine and Lukes powerpoint slides, still need to fix the level not resetting after returning to the menu screen
</commit_message>
<xml_diff>
--- a/tgp powerpoint.pptx
+++ b/tgp powerpoint.pptx
@@ -306,7 +306,7 @@
           <a:p>
             <a:fld id="{6781D6B9-A2A8-49BE-99F2-F20438EE95EB}" type="datetimeFigureOut">
               <a:rPr lang="en-US" smtClean="0"/>
-              <a:t>3/28/2017</a:t>
+              <a:t>3/30/2017</a:t>
             </a:fld>
             <a:endParaRPr lang="en-US"/>
           </a:p>
@@ -581,7 +581,7 @@
           <a:p>
             <a:fld id="{6781D6B9-A2A8-49BE-99F2-F20438EE95EB}" type="datetimeFigureOut">
               <a:rPr lang="en-US" smtClean="0"/>
-              <a:t>3/28/2017</a:t>
+              <a:t>3/30/2017</a:t>
             </a:fld>
             <a:endParaRPr lang="en-US"/>
           </a:p>
@@ -775,7 +775,7 @@
           <a:p>
             <a:fld id="{6781D6B9-A2A8-49BE-99F2-F20438EE95EB}" type="datetimeFigureOut">
               <a:rPr lang="en-US" smtClean="0"/>
-              <a:t>3/28/2017</a:t>
+              <a:t>3/30/2017</a:t>
             </a:fld>
             <a:endParaRPr lang="en-US"/>
           </a:p>
@@ -1046,7 +1046,7 @@
           <a:p>
             <a:fld id="{6781D6B9-A2A8-49BE-99F2-F20438EE95EB}" type="datetimeFigureOut">
               <a:rPr lang="en-US" smtClean="0"/>
-              <a:t>3/28/2017</a:t>
+              <a:t>3/30/2017</a:t>
             </a:fld>
             <a:endParaRPr lang="en-US"/>
           </a:p>
@@ -1373,7 +1373,7 @@
           <a:p>
             <a:fld id="{6781D6B9-A2A8-49BE-99F2-F20438EE95EB}" type="datetimeFigureOut">
               <a:rPr lang="en-US" smtClean="0"/>
-              <a:t>3/28/2017</a:t>
+              <a:t>3/30/2017</a:t>
             </a:fld>
             <a:endParaRPr lang="en-US"/>
           </a:p>
@@ -1992,7 +1992,7 @@
           <a:p>
             <a:fld id="{6781D6B9-A2A8-49BE-99F2-F20438EE95EB}" type="datetimeFigureOut">
               <a:rPr lang="en-US" smtClean="0"/>
-              <a:t>3/28/2017</a:t>
+              <a:t>3/30/2017</a:t>
             </a:fld>
             <a:endParaRPr lang="en-US"/>
           </a:p>
@@ -2839,7 +2839,7 @@
           <a:p>
             <a:fld id="{6781D6B9-A2A8-49BE-99F2-F20438EE95EB}" type="datetimeFigureOut">
               <a:rPr lang="en-US" smtClean="0"/>
-              <a:t>3/28/2017</a:t>
+              <a:t>3/30/2017</a:t>
             </a:fld>
             <a:endParaRPr lang="en-US"/>
           </a:p>
@@ -3009,7 +3009,7 @@
           <a:p>
             <a:fld id="{6781D6B9-A2A8-49BE-99F2-F20438EE95EB}" type="datetimeFigureOut">
               <a:rPr lang="en-US" smtClean="0"/>
-              <a:t>3/28/2017</a:t>
+              <a:t>3/30/2017</a:t>
             </a:fld>
             <a:endParaRPr lang="en-US"/>
           </a:p>
@@ -3189,7 +3189,7 @@
           <a:p>
             <a:fld id="{6781D6B9-A2A8-49BE-99F2-F20438EE95EB}" type="datetimeFigureOut">
               <a:rPr lang="en-US" smtClean="0"/>
-              <a:t>3/28/2017</a:t>
+              <a:t>3/30/2017</a:t>
             </a:fld>
             <a:endParaRPr lang="en-US"/>
           </a:p>
@@ -3359,7 +3359,7 @@
           <a:p>
             <a:fld id="{6781D6B9-A2A8-49BE-99F2-F20438EE95EB}" type="datetimeFigureOut">
               <a:rPr lang="en-US" smtClean="0"/>
-              <a:t>3/28/2017</a:t>
+              <a:t>3/30/2017</a:t>
             </a:fld>
             <a:endParaRPr lang="en-US"/>
           </a:p>
@@ -3606,7 +3606,7 @@
           <a:p>
             <a:fld id="{6781D6B9-A2A8-49BE-99F2-F20438EE95EB}" type="datetimeFigureOut">
               <a:rPr lang="en-US" smtClean="0"/>
-              <a:t>3/28/2017</a:t>
+              <a:t>3/30/2017</a:t>
             </a:fld>
             <a:endParaRPr lang="en-US"/>
           </a:p>
@@ -3898,7 +3898,7 @@
           <a:p>
             <a:fld id="{6781D6B9-A2A8-49BE-99F2-F20438EE95EB}" type="datetimeFigureOut">
               <a:rPr lang="en-US" smtClean="0"/>
-              <a:t>3/28/2017</a:t>
+              <a:t>3/30/2017</a:t>
             </a:fld>
             <a:endParaRPr lang="en-US"/>
           </a:p>
@@ -4342,7 +4342,7 @@
           <a:p>
             <a:fld id="{6781D6B9-A2A8-49BE-99F2-F20438EE95EB}" type="datetimeFigureOut">
               <a:rPr lang="en-US" smtClean="0"/>
-              <a:t>3/28/2017</a:t>
+              <a:t>3/30/2017</a:t>
             </a:fld>
             <a:endParaRPr lang="en-US"/>
           </a:p>
@@ -4460,7 +4460,7 @@
           <a:p>
             <a:fld id="{6781D6B9-A2A8-49BE-99F2-F20438EE95EB}" type="datetimeFigureOut">
               <a:rPr lang="en-US" smtClean="0"/>
-              <a:t>3/28/2017</a:t>
+              <a:t>3/30/2017</a:t>
             </a:fld>
             <a:endParaRPr lang="en-US"/>
           </a:p>
@@ -4555,7 +4555,7 @@
           <a:p>
             <a:fld id="{6781D6B9-A2A8-49BE-99F2-F20438EE95EB}" type="datetimeFigureOut">
               <a:rPr lang="en-US" smtClean="0"/>
-              <a:t>3/28/2017</a:t>
+              <a:t>3/30/2017</a:t>
             </a:fld>
             <a:endParaRPr lang="en-US"/>
           </a:p>
@@ -4834,7 +4834,7 @@
           <a:p>
             <a:fld id="{6781D6B9-A2A8-49BE-99F2-F20438EE95EB}" type="datetimeFigureOut">
               <a:rPr lang="en-US" smtClean="0"/>
-              <a:t>3/28/2017</a:t>
+              <a:t>3/30/2017</a:t>
             </a:fld>
             <a:endParaRPr lang="en-US"/>
           </a:p>
@@ -5109,7 +5109,7 @@
           <a:p>
             <a:fld id="{6781D6B9-A2A8-49BE-99F2-F20438EE95EB}" type="datetimeFigureOut">
               <a:rPr lang="en-US" smtClean="0"/>
-              <a:t>3/28/2017</a:t>
+              <a:t>3/30/2017</a:t>
             </a:fld>
             <a:endParaRPr lang="en-US"/>
           </a:p>
@@ -5532,7 +5532,7 @@
           <a:p>
             <a:fld id="{6781D6B9-A2A8-49BE-99F2-F20438EE95EB}" type="datetimeFigureOut">
               <a:rPr lang="en-US" smtClean="0"/>
-              <a:t>3/28/2017</a:t>
+              <a:t>3/30/2017</a:t>
             </a:fld>
             <a:endParaRPr lang="en-US"/>
           </a:p>
@@ -6170,7 +6170,32 @@
           <a:bodyPr/>
           <a:lstStyle/>
           <a:p>
-            <a:endParaRPr lang="en-US"/>
+            <a:r>
+              <a:rPr lang="en-GB" dirty="0" smtClean="0"/>
+              <a:t>Changes that we have made include</a:t>
+            </a:r>
+            <a:r>
+              <a:rPr lang="en-US" dirty="0" smtClean="0"/>
+              <a:t>:</a:t>
+            </a:r>
+          </a:p>
+          <a:p>
+            <a:r>
+              <a:rPr lang="en-GB" dirty="0" smtClean="0"/>
+              <a:t>A coin system so that players can buy hints to help with the level.</a:t>
+            </a:r>
+          </a:p>
+          <a:p>
+            <a:r>
+              <a:rPr lang="en-GB" dirty="0" smtClean="0"/>
+              <a:t>Random letter generation that spaces out the letters and makes sure that none of them overlap.</a:t>
+            </a:r>
+          </a:p>
+          <a:p>
+            <a:r>
+              <a:rPr lang="en-GB" dirty="0" smtClean="0"/>
+              <a:t>We have added physics to a few of the letters so that they fly onto the screen.</a:t>
+            </a:r>
           </a:p>
         </p:txBody>
       </p:sp>
@@ -6242,7 +6267,27 @@
           <a:bodyPr/>
           <a:lstStyle/>
           <a:p>
-            <a:endParaRPr lang="en-US"/>
+            <a:r>
+              <a:rPr lang="en-GB" dirty="0" smtClean="0"/>
+              <a:t>The aim of the game is to collect all of the letters on the screen in the correct order to make the word.</a:t>
+            </a:r>
+          </a:p>
+          <a:p>
+            <a:r>
+              <a:rPr lang="en-GB" dirty="0" smtClean="0"/>
+              <a:t>Collected incorrect letters can be tapped to put them back into the world.</a:t>
+            </a:r>
+          </a:p>
+          <a:p>
+            <a:r>
+              <a:rPr lang="en-GB" dirty="0" smtClean="0"/>
+              <a:t>A level is complete when the word </a:t>
+            </a:r>
+            <a:r>
+              <a:rPr lang="en-GB" smtClean="0"/>
+              <a:t>is correctly spelled.</a:t>
+            </a:r>
+            <a:endParaRPr lang="en-US" dirty="0"/>
           </a:p>
         </p:txBody>
       </p:sp>
@@ -6408,11 +6453,7 @@
           <a:p>
             <a:r>
               <a:rPr lang="en-GB" dirty="0" smtClean="0"/>
-              <a:t>These rewards will be our in-game currency starting with 10 coins on day 1 to 50 on day 5</a:t>
-            </a:r>
-            <a:r>
-              <a:rPr lang="en-GB" dirty="0" smtClean="0"/>
-              <a:t>.</a:t>
+              <a:t>These rewards will be our in-game currency starting with 10 coins on day 1 to 50 on day 5.</a:t>
             </a:r>
             <a:endParaRPr lang="en-GB" dirty="0"/>
           </a:p>
@@ -6745,6 +6786,72 @@
         <p:txBody>
           <a:bodyPr/>
           <a:lstStyle/>
+          <a:p>
+            <a:r>
+              <a:rPr lang="en-GB" dirty="0" smtClean="0"/>
+              <a:t>In the future we plan to ship the following updates to Learning Quest:</a:t>
+            </a:r>
+          </a:p>
+          <a:p>
+            <a:pPr>
+              <a:buFont typeface="Wingdings" panose="05000000000000000000" pitchFamily="2" charset="2"/>
+              <a:buChar char="§"/>
+            </a:pPr>
+            <a:r>
+              <a:rPr lang="en-GB" dirty="0" smtClean="0"/>
+              <a:t>Extra character skins, some of which can be micro transactions</a:t>
+            </a:r>
+          </a:p>
+          <a:p>
+            <a:pPr>
+              <a:buFont typeface="Wingdings" panose="05000000000000000000" pitchFamily="2" charset="2"/>
+              <a:buChar char="§"/>
+            </a:pPr>
+            <a:r>
+              <a:rPr lang="en-GB" dirty="0" smtClean="0"/>
+              <a:t>More levels with different challenges and environments</a:t>
+            </a:r>
+          </a:p>
+          <a:p>
+            <a:pPr>
+              <a:buFont typeface="Wingdings" panose="05000000000000000000" pitchFamily="2" charset="2"/>
+              <a:buChar char="§"/>
+            </a:pPr>
+            <a:r>
+              <a:rPr lang="en-GB" dirty="0" smtClean="0"/>
+              <a:t>Seasonal events with limited skins and environments</a:t>
+            </a:r>
+          </a:p>
+          <a:p>
+            <a:pPr>
+              <a:buFont typeface="Wingdings" panose="05000000000000000000" pitchFamily="2" charset="2"/>
+              <a:buChar char="§"/>
+            </a:pPr>
+            <a:r>
+              <a:rPr lang="en-GB" dirty="0" smtClean="0"/>
+              <a:t>Graphical Improvements</a:t>
+            </a:r>
+          </a:p>
+          <a:p>
+            <a:pPr>
+              <a:buFont typeface="Wingdings" panose="05000000000000000000" pitchFamily="2" charset="2"/>
+              <a:buChar char="§"/>
+            </a:pPr>
+            <a:r>
+              <a:rPr lang="en-GB" dirty="0" smtClean="0"/>
+              <a:t>Better support for tablet devices</a:t>
+            </a:r>
+          </a:p>
+          <a:p>
+            <a:pPr>
+              <a:buFont typeface="Wingdings" panose="05000000000000000000" pitchFamily="2" charset="2"/>
+              <a:buChar char="§"/>
+            </a:pPr>
+            <a:r>
+              <a:rPr lang="en-GB" dirty="0" smtClean="0"/>
+              <a:t>Different subjects to add more variance, e.g. a maths set of levels to add more learning capabilities.  </a:t>
+            </a:r>
+          </a:p>
           <a:p>
             <a:endParaRPr lang="en-US" dirty="0"/>
           </a:p>

</xml_diff>

<commit_message>
Done! Ready for the presentation!
</commit_message>
<xml_diff>
--- a/tgp powerpoint.pptx
+++ b/tgp powerpoint.pptx
@@ -6078,7 +6078,7 @@
           <a:p>
             <a:r>
               <a:rPr lang="en-GB" dirty="0" smtClean="0"/>
-              <a:t>Learning quest </a:t>
+              <a:t>Learning Quest </a:t>
             </a:r>
             <a:endParaRPr lang="en-US" dirty="0"/>
           </a:p>
@@ -6288,7 +6288,7 @@
           <a:p>
             <a:r>
               <a:rPr lang="en-GB" dirty="0" smtClean="0"/>
-              <a:t>Tag Line				</a:t>
+              <a:t>Tag Line</a:t>
             </a:r>
             <a:endParaRPr lang="en-US" dirty="0"/>
           </a:p>
@@ -6310,52 +6310,68 @@
           <a:lstStyle/>
           <a:p>
             <a:r>
+              <a:rPr lang="en-GB" dirty="0"/>
+              <a:t>Learning </a:t>
+            </a:r>
+            <a:r>
               <a:rPr lang="en-GB" dirty="0" smtClean="0"/>
-              <a:t>Learning quest is a colourful playground adventure where even the sky isn’t the limit. Run and jump from swings to clouds picking up letters to spell words and progress </a:t>
+              <a:t>Quest </a:t>
+            </a:r>
+            <a:r>
+              <a:rPr lang="en-GB" dirty="0"/>
+              <a:t>is a colourful playground adventure where even the sky isn’t the </a:t>
+            </a:r>
+            <a:r>
+              <a:rPr lang="en-GB" dirty="0" smtClean="0"/>
+              <a:t>limit. </a:t>
             </a:r>
             <a:r>
               <a:rPr lang="en-GB" smtClean="0"/>
-              <a:t>through levels.</a:t>
-            </a:r>
-            <a:endParaRPr lang="en-GB" dirty="0" smtClean="0"/>
-          </a:p>
-          <a:p>
-            <a:endParaRPr lang="en-GB" dirty="0"/>
-          </a:p>
-          <a:p>
-            <a:endParaRPr lang="en-GB" dirty="0" smtClean="0"/>
-          </a:p>
-          <a:p>
-            <a:endParaRPr lang="en-GB" dirty="0"/>
-          </a:p>
-          <a:p>
-            <a:endParaRPr lang="en-GB" dirty="0" smtClean="0"/>
-          </a:p>
-          <a:p>
-            <a:endParaRPr lang="en-GB" dirty="0"/>
+              <a:t>Run </a:t>
+            </a:r>
+            <a:r>
+              <a:rPr lang="en-GB" dirty="0"/>
+              <a:t>and jump from swings to clouds picking up letters to spell words and progress through levels.</a:t>
+            </a:r>
           </a:p>
           <a:p>
             <a:endParaRPr lang="en-US" dirty="0"/>
           </a:p>
         </p:txBody>
       </p:sp>
+      <p:pic>
+        <p:nvPicPr>
+          <p:cNvPr id="4" name="Picture 3"/>
+          <p:cNvPicPr>
+            <a:picLocks noChangeAspect="1"/>
+          </p:cNvPicPr>
+          <p:nvPr/>
+        </p:nvPicPr>
+        <p:blipFill rotWithShape="1">
+          <a:blip r:embed="rId2"/>
+          <a:srcRect t="6536" b="78488"/>
+          <a:stretch/>
+        </p:blipFill>
+        <p:spPr>
+          <a:xfrm>
+            <a:off x="6014258" y="3433155"/>
+            <a:ext cx="4193772" cy="1170671"/>
+          </a:xfrm>
+          <a:prstGeom prst="rect">
+            <a:avLst/>
+          </a:prstGeom>
+        </p:spPr>
+      </p:pic>
     </p:spTree>
     <p:extLst>
       <p:ext uri="{BB962C8B-B14F-4D97-AF65-F5344CB8AC3E}">
-        <p14:creationId xmlns:p14="http://schemas.microsoft.com/office/powerpoint/2010/main" val="1696043134"/>
+        <p14:creationId xmlns:p14="http://schemas.microsoft.com/office/powerpoint/2010/main" val="2978225990"/>
       </p:ext>
     </p:extLst>
   </p:cSld>
   <p:clrMapOvr>
     <a:masterClrMapping/>
   </p:clrMapOvr>
-  <p:timing>
-    <p:tnLst>
-      <p:par>
-        <p:cTn id="1" dur="indefinite" restart="never" nodeType="tmRoot"/>
-      </p:par>
-    </p:tnLst>
-  </p:timing>
 </p:sld>
 </file>
 
@@ -6393,7 +6409,7 @@
           <a:p>
             <a:r>
               <a:rPr lang="en-GB" dirty="0" smtClean="0"/>
-              <a:t>Changes form last time</a:t>
+              <a:t>Changes from last time</a:t>
             </a:r>
             <a:endParaRPr lang="en-US" dirty="0"/>
           </a:p>
@@ -6535,6 +6551,30 @@
           </a:p>
         </p:txBody>
       </p:sp>
+      <p:pic>
+        <p:nvPicPr>
+          <p:cNvPr id="4" name="Picture 3"/>
+          <p:cNvPicPr>
+            <a:picLocks noChangeAspect="1"/>
+          </p:cNvPicPr>
+          <p:nvPr/>
+        </p:nvPicPr>
+        <p:blipFill>
+          <a:blip r:embed="rId2"/>
+          <a:stretch>
+            <a:fillRect/>
+          </a:stretch>
+        </p:blipFill>
+        <p:spPr>
+          <a:xfrm>
+            <a:off x="9668948" y="2385753"/>
+            <a:ext cx="2301199" cy="4289367"/>
+          </a:xfrm>
+          <a:prstGeom prst="rect">
+            <a:avLst/>
+          </a:prstGeom>
+        </p:spPr>
+      </p:pic>
     </p:spTree>
     <p:extLst>
       <p:ext uri="{BB962C8B-B14F-4D97-AF65-F5344CB8AC3E}">
@@ -6610,10 +6650,56 @@
           <a:bodyPr/>
           <a:lstStyle/>
           <a:p>
+            <a:r>
+              <a:rPr lang="en-GB" dirty="0" smtClean="0"/>
+              <a:t>Children aged 5-8</a:t>
+            </a:r>
+          </a:p>
+          <a:p>
+            <a:r>
+              <a:rPr lang="en-GB" dirty="0" smtClean="0"/>
+              <a:t>Bright, colourful backgrounds</a:t>
+            </a:r>
+          </a:p>
+          <a:p>
+            <a:r>
+              <a:rPr lang="en-GB" dirty="0" smtClean="0"/>
+              <a:t>Age appropriate words to find</a:t>
+            </a:r>
+          </a:p>
+          <a:p>
+            <a:r>
+              <a:rPr lang="en-GB" dirty="0" smtClean="0"/>
+              <a:t>Appropriately worded hints</a:t>
+            </a:r>
             <a:endParaRPr lang="en-US" dirty="0"/>
           </a:p>
         </p:txBody>
       </p:sp>
+      <p:pic>
+        <p:nvPicPr>
+          <p:cNvPr id="4" name="Picture 3"/>
+          <p:cNvPicPr>
+            <a:picLocks noChangeAspect="1"/>
+          </p:cNvPicPr>
+          <p:nvPr/>
+        </p:nvPicPr>
+        <p:blipFill>
+          <a:blip r:embed="rId2"/>
+          <a:stretch>
+            <a:fillRect/>
+          </a:stretch>
+        </p:blipFill>
+        <p:spPr>
+          <a:xfrm>
+            <a:off x="5772002" y="2594091"/>
+            <a:ext cx="6152843" cy="4103118"/>
+          </a:xfrm>
+          <a:prstGeom prst="rect">
+            <a:avLst/>
+          </a:prstGeom>
+        </p:spPr>
+      </p:pic>
     </p:spTree>
     <p:extLst>
       <p:ext uri="{BB962C8B-B14F-4D97-AF65-F5344CB8AC3E}">
@@ -6778,6 +6864,16 @@
           <a:bodyPr/>
           <a:lstStyle/>
           <a:p>
+            <a:r>
+              <a:rPr lang="en-GB" dirty="0" smtClean="0"/>
+              <a:t>The average play session of Learning Quest is likely to be 5-10 minutes as players will want to sign in daily to collect their daily rewards, and then they will hopefully stick around to play a few levels.</a:t>
+            </a:r>
+          </a:p>
+          <a:p>
+            <a:r>
+              <a:rPr lang="en-GB" dirty="0" smtClean="0"/>
+              <a:t>Players will also be attracted to the mentally challenging aspect of the game.</a:t>
+            </a:r>
             <a:endParaRPr lang="en-US" dirty="0"/>
           </a:p>
         </p:txBody>
@@ -6859,12 +6955,48 @@
           <a:p>
             <a:r>
               <a:rPr lang="en-GB" dirty="0" smtClean="0"/>
-              <a:t>Able to buy the in-game currency </a:t>
+              <a:t>Able to buy the in-game currency.</a:t>
+            </a:r>
+          </a:p>
+          <a:p>
+            <a:r>
+              <a:rPr lang="en-GB" dirty="0" smtClean="0"/>
+              <a:t>For more money, players can get better deals on the in-game currency.</a:t>
+            </a:r>
+          </a:p>
+          <a:p>
+            <a:r>
+              <a:rPr lang="en-GB" dirty="0" smtClean="0"/>
+              <a:t>At the start of the game, players will be given a small amount of in-game currency to play with which will hopefully entice them into buying more. </a:t>
             </a:r>
             <a:endParaRPr lang="en-US" dirty="0"/>
           </a:p>
         </p:txBody>
       </p:sp>
+      <p:pic>
+        <p:nvPicPr>
+          <p:cNvPr id="4" name="Picture 3"/>
+          <p:cNvPicPr>
+            <a:picLocks noChangeAspect="1"/>
+          </p:cNvPicPr>
+          <p:nvPr/>
+        </p:nvPicPr>
+        <p:blipFill>
+          <a:blip r:embed="rId2"/>
+          <a:stretch>
+            <a:fillRect/>
+          </a:stretch>
+        </p:blipFill>
+        <p:spPr>
+          <a:xfrm>
+            <a:off x="5160711" y="3912522"/>
+            <a:ext cx="4889142" cy="2750142"/>
+          </a:xfrm>
+          <a:prstGeom prst="rect">
+            <a:avLst/>
+          </a:prstGeom>
+        </p:spPr>
+      </p:pic>
     </p:spTree>
     <p:extLst>
       <p:ext uri="{BB962C8B-B14F-4D97-AF65-F5344CB8AC3E}">
@@ -6942,7 +7074,7 @@
           <a:p>
             <a:r>
               <a:rPr lang="en-GB" dirty="0" smtClean="0"/>
-              <a:t>After a couple of levels has been completed, a advert will pop up.</a:t>
+              <a:t>After a couple of levels has been completed, an advert will pop up.</a:t>
             </a:r>
           </a:p>
           <a:p>
@@ -6956,6 +7088,29 @@
           </a:p>
         </p:txBody>
       </p:sp>
+      <p:pic>
+        <p:nvPicPr>
+          <p:cNvPr id="4" name="Picture 3"/>
+          <p:cNvPicPr>
+            <a:picLocks noChangeAspect="1"/>
+          </p:cNvPicPr>
+          <p:nvPr/>
+        </p:nvPicPr>
+        <p:blipFill rotWithShape="1">
+          <a:blip r:embed="rId2"/>
+          <a:srcRect l="10873" t="19376" r="10800" b="14955"/>
+          <a:stretch/>
+        </p:blipFill>
+        <p:spPr>
+          <a:xfrm>
+            <a:off x="9434945" y="2797987"/>
+            <a:ext cx="2635134" cy="3927010"/>
+          </a:xfrm>
+          <a:prstGeom prst="rect">
+            <a:avLst/>
+          </a:prstGeom>
+        </p:spPr>
+      </p:pic>
     </p:spTree>
     <p:extLst>
       <p:ext uri="{BB962C8B-B14F-4D97-AF65-F5344CB8AC3E}">

</xml_diff>